<commit_message>
minor updates to prez
</commit_message>
<xml_diff>
--- a/2022-04-28 - AutoRest The Module Generator/PowerShell Summit 2022 - AutoRest.pptx
+++ b/2022-04-28 - AutoRest The Module Generator/PowerShell Summit 2022 - AutoRest.pptx
@@ -7,7 +7,7 @@
   <p:sldIdLst>
     <p:sldId id="256" r:id="rId2"/>
     <p:sldId id="257" r:id="rId3"/>
-    <p:sldId id="277" r:id="rId4"/>
+    <p:sldId id="279" r:id="rId4"/>
     <p:sldId id="274" r:id="rId5"/>
     <p:sldId id="269" r:id="rId6"/>
     <p:sldId id="258" r:id="rId7"/>
@@ -114,6 +114,28 @@
     </a:lvl9pPr>
   </p:defaultTextStyle>
   <p:extLst>
+    <p:ext uri="{521415D9-36F7-43E2-AB2F-B90AF26B5E84}">
+      <p14:sectionLst xmlns:p14="http://schemas.microsoft.com/office/powerpoint/2010/main">
+        <p14:section name="Default Section" id="{E10ECDEE-F33E-42A8-AF25-E554F9695B58}">
+          <p14:sldIdLst>
+            <p14:sldId id="256"/>
+            <p14:sldId id="257"/>
+          </p14:sldIdLst>
+        </p14:section>
+        <p14:section name="Untitled Section" id="{642633CB-1160-40D6-B728-0B6B01710F26}">
+          <p14:sldIdLst>
+            <p14:sldId id="279"/>
+            <p14:sldId id="274"/>
+            <p14:sldId id="269"/>
+            <p14:sldId id="258"/>
+            <p14:sldId id="272"/>
+            <p14:sldId id="271"/>
+            <p14:sldId id="268"/>
+            <p14:sldId id="273"/>
+          </p14:sldIdLst>
+        </p14:section>
+      </p14:sectionLst>
+    </p:ext>
     <p:ext uri="{EFAFB233-063F-42B5-8137-9DF3F51BA10A}">
       <p15:sldGuideLst xmlns:p15="http://schemas.microsoft.com/office/powerpoint/2012/main"/>
     </p:ext>
@@ -268,7 +290,7 @@
           <a:p>
             <a:fld id="{D46B952B-F692-4DD1-9678-FCDA40C3FC40}" type="datetimeFigureOut">
               <a:rPr lang="en-US" smtClean="0"/>
-              <a:t>4/25/2022</a:t>
+              <a:t>4/26/2022</a:t>
             </a:fld>
             <a:endParaRPr lang="en-US"/>
           </a:p>
@@ -466,7 +488,7 @@
           <a:p>
             <a:fld id="{D46B952B-F692-4DD1-9678-FCDA40C3FC40}" type="datetimeFigureOut">
               <a:rPr lang="en-US" smtClean="0"/>
-              <a:t>4/25/2022</a:t>
+              <a:t>4/26/2022</a:t>
             </a:fld>
             <a:endParaRPr lang="en-US"/>
           </a:p>
@@ -674,7 +696,7 @@
           <a:p>
             <a:fld id="{D46B952B-F692-4DD1-9678-FCDA40C3FC40}" type="datetimeFigureOut">
               <a:rPr lang="en-US" smtClean="0"/>
-              <a:t>4/25/2022</a:t>
+              <a:t>4/26/2022</a:t>
             </a:fld>
             <a:endParaRPr lang="en-US"/>
           </a:p>
@@ -872,7 +894,7 @@
           <a:p>
             <a:fld id="{D46B952B-F692-4DD1-9678-FCDA40C3FC40}" type="datetimeFigureOut">
               <a:rPr lang="en-US" smtClean="0"/>
-              <a:t>4/25/2022</a:t>
+              <a:t>4/26/2022</a:t>
             </a:fld>
             <a:endParaRPr lang="en-US"/>
           </a:p>
@@ -1147,7 +1169,7 @@
           <a:p>
             <a:fld id="{D46B952B-F692-4DD1-9678-FCDA40C3FC40}" type="datetimeFigureOut">
               <a:rPr lang="en-US" smtClean="0"/>
-              <a:t>4/25/2022</a:t>
+              <a:t>4/26/2022</a:t>
             </a:fld>
             <a:endParaRPr lang="en-US"/>
           </a:p>
@@ -1412,7 +1434,7 @@
           <a:p>
             <a:fld id="{D46B952B-F692-4DD1-9678-FCDA40C3FC40}" type="datetimeFigureOut">
               <a:rPr lang="en-US" smtClean="0"/>
-              <a:t>4/25/2022</a:t>
+              <a:t>4/26/2022</a:t>
             </a:fld>
             <a:endParaRPr lang="en-US"/>
           </a:p>
@@ -1824,7 +1846,7 @@
           <a:p>
             <a:fld id="{D46B952B-F692-4DD1-9678-FCDA40C3FC40}" type="datetimeFigureOut">
               <a:rPr lang="en-US" smtClean="0"/>
-              <a:t>4/25/2022</a:t>
+              <a:t>4/26/2022</a:t>
             </a:fld>
             <a:endParaRPr lang="en-US"/>
           </a:p>
@@ -1965,7 +1987,7 @@
           <a:p>
             <a:fld id="{D46B952B-F692-4DD1-9678-FCDA40C3FC40}" type="datetimeFigureOut">
               <a:rPr lang="en-US" smtClean="0"/>
-              <a:t>4/25/2022</a:t>
+              <a:t>4/26/2022</a:t>
             </a:fld>
             <a:endParaRPr lang="en-US"/>
           </a:p>
@@ -2078,7 +2100,7 @@
           <a:p>
             <a:fld id="{D46B952B-F692-4DD1-9678-FCDA40C3FC40}" type="datetimeFigureOut">
               <a:rPr lang="en-US" smtClean="0"/>
-              <a:t>4/25/2022</a:t>
+              <a:t>4/26/2022</a:t>
             </a:fld>
             <a:endParaRPr lang="en-US"/>
           </a:p>
@@ -2389,7 +2411,7 @@
           <a:p>
             <a:fld id="{D46B952B-F692-4DD1-9678-FCDA40C3FC40}" type="datetimeFigureOut">
               <a:rPr lang="en-US" smtClean="0"/>
-              <a:t>4/25/2022</a:t>
+              <a:t>4/26/2022</a:t>
             </a:fld>
             <a:endParaRPr lang="en-US"/>
           </a:p>
@@ -2677,7 +2699,7 @@
           <a:p>
             <a:fld id="{D46B952B-F692-4DD1-9678-FCDA40C3FC40}" type="datetimeFigureOut">
               <a:rPr lang="en-US" smtClean="0"/>
-              <a:t>4/25/2022</a:t>
+              <a:t>4/26/2022</a:t>
             </a:fld>
             <a:endParaRPr lang="en-US"/>
           </a:p>
@@ -2927,7 +2949,7 @@
           <a:p>
             <a:fld id="{D46B952B-F692-4DD1-9678-FCDA40C3FC40}" type="datetimeFigureOut">
               <a:rPr lang="en-US" smtClean="0"/>
-              <a:t>4/25/2022</a:t>
+              <a:t>4/26/2022</a:t>
             </a:fld>
             <a:endParaRPr lang="en-US"/>
           </a:p>
@@ -4288,7 +4310,7 @@
           <p:cNvPr id="2" name="Title 1">
             <a:extLst>
               <a:ext uri="{FF2B5EF4-FFF2-40B4-BE49-F238E27FC236}">
-                <a16:creationId xmlns:a16="http://schemas.microsoft.com/office/drawing/2014/main" id="{6565FD82-9732-4750-8699-88FFD2186064}"/>
+                <a16:creationId xmlns:a16="http://schemas.microsoft.com/office/drawing/2014/main" id="{11D4D5A4-69A5-4AEE-9730-18196CF66DE5}"/>
               </a:ext>
             </a:extLst>
           </p:cNvPr>
@@ -4306,70 +4328,505 @@
           <a:p>
             <a:r>
               <a:rPr lang="en-US" dirty="0"/>
-              <a:t>Eugene, Oregon</a:t>
-            </a:r>
-          </a:p>
-        </p:txBody>
-      </p:sp>
-      <p:pic>
-        <p:nvPicPr>
-          <p:cNvPr id="1026" name="Picture 2">
-            <a:extLst>
-              <a:ext uri="{FF2B5EF4-FFF2-40B4-BE49-F238E27FC236}">
-                <a16:creationId xmlns:a16="http://schemas.microsoft.com/office/drawing/2014/main" id="{A8A15C21-5A54-4C7D-BD14-A6EFA3A2859F}"/>
-              </a:ext>
-            </a:extLst>
-          </p:cNvPr>
-          <p:cNvPicPr>
-            <a:picLocks noGrp="1" noChangeAspect="1" noChangeArrowheads="1"/>
-          </p:cNvPicPr>
+              <a:t>Runway</a:t>
+            </a:r>
+          </a:p>
+        </p:txBody>
+      </p:sp>
+      <p:sp>
+        <p:nvSpPr>
+          <p:cNvPr id="3" name="Content Placeholder 2">
+            <a:extLst>
+              <a:ext uri="{FF2B5EF4-FFF2-40B4-BE49-F238E27FC236}">
+                <a16:creationId xmlns:a16="http://schemas.microsoft.com/office/drawing/2014/main" id="{89BF1494-C104-49C6-85B4-97DFCB5C9A87}"/>
+              </a:ext>
+            </a:extLst>
+          </p:cNvPr>
+          <p:cNvSpPr>
+            <a:spLocks noGrp="1"/>
+          </p:cNvSpPr>
           <p:nvPr>
             <p:ph idx="1"/>
           </p:nvPr>
-        </p:nvPicPr>
-        <p:blipFill>
-          <a:blip r:embed="rId2">
-            <a:extLst>
-              <a:ext uri="{28A0092B-C50C-407E-A947-70E740481C1C}">
-                <a14:useLocalDpi xmlns:a14="http://schemas.microsoft.com/office/drawing/2010/main" val="0"/>
-              </a:ext>
-            </a:extLst>
-          </a:blip>
-          <a:srcRect/>
-          <a:stretch>
-            <a:fillRect/>
-          </a:stretch>
-        </p:blipFill>
-        <p:spPr bwMode="auto">
-          <a:xfrm>
-            <a:off x="4063895" y="2578821"/>
-            <a:ext cx="4064209" cy="2844946"/>
-          </a:xfrm>
-          <a:prstGeom prst="rect">
-            <a:avLst/>
-          </a:prstGeom>
-          <a:noFill/>
-          <a:extLst>
-            <a:ext uri="{909E8E84-426E-40DD-AFC4-6F175D3DCCD1}">
-              <a14:hiddenFill xmlns:a14="http://schemas.microsoft.com/office/drawing/2010/main">
-                <a:solidFill>
-                  <a:srgbClr val="FFFFFF"/>
-                </a:solidFill>
-              </a14:hiddenFill>
-            </a:ext>
-          </a:extLst>
-        </p:spPr>
-      </p:pic>
+        </p:nvSpPr>
+        <p:spPr/>
+        <p:txBody>
+          <a:bodyPr/>
+          <a:lstStyle/>
+          <a:p>
+            <a:r>
+              <a:rPr lang="en-US" dirty="0"/>
+              <a:t>Agent based orchestration platform</a:t>
+            </a:r>
+          </a:p>
+          <a:p>
+            <a:r>
+              <a:rPr lang="en-US" dirty="0"/>
+              <a:t>Run any code anywhere (including PowerShell)</a:t>
+            </a:r>
+          </a:p>
+          <a:p>
+            <a:r>
+              <a:rPr lang="en-US" dirty="0"/>
+              <a:t>Fully API driven (with PowerShell SDK)</a:t>
+            </a:r>
+          </a:p>
+          <a:p>
+            <a:r>
+              <a:rPr lang="en-US" dirty="0"/>
+              <a:t>Supports Windows, Linux, and containers</a:t>
+            </a:r>
+          </a:p>
+          <a:p>
+            <a:r>
+              <a:rPr lang="en-US" dirty="0"/>
+              <a:t>Move data between any endpoints, no network requirements</a:t>
+            </a:r>
+          </a:p>
+          <a:p>
+            <a:r>
+              <a:rPr lang="en-US" dirty="0"/>
+              <a:t>We are invested heavily in PowerShell because I like PowerShell</a:t>
+            </a:r>
+          </a:p>
+          <a:p>
+            <a:r>
+              <a:rPr lang="en-US" dirty="0"/>
+              <a:t>If you want a free account, reach out</a:t>
+            </a:r>
+          </a:p>
+          <a:p>
+            <a:pPr lvl="1"/>
+            <a:r>
+              <a:rPr lang="en-US" dirty="0" err="1">
+                <a:hlinkClick r:id="rId2"/>
+              </a:rPr>
+              <a:t>anthony@runway.host</a:t>
+            </a:r>
+            <a:r>
+              <a:rPr lang="en-US" dirty="0"/>
+              <a:t> </a:t>
+            </a:r>
+          </a:p>
+        </p:txBody>
+      </p:sp>
     </p:spTree>
     <p:extLst>
       <p:ext uri="{BB962C8B-B14F-4D97-AF65-F5344CB8AC3E}">
-        <p14:creationId xmlns:p14="http://schemas.microsoft.com/office/powerpoint/2010/main" val="103183490"/>
+        <p14:creationId xmlns:p14="http://schemas.microsoft.com/office/powerpoint/2010/main" val="3047056906"/>
       </p:ext>
     </p:extLst>
   </p:cSld>
   <p:clrMapOvr>
     <a:masterClrMapping/>
   </p:clrMapOvr>
+  <p:timing>
+    <p:tnLst>
+      <p:par>
+        <p:cTn id="1" dur="indefinite" restart="never" nodeType="tmRoot">
+          <p:childTnLst>
+            <p:seq concurrent="1" nextAc="seek">
+              <p:cTn id="2" dur="indefinite" nodeType="mainSeq">
+                <p:childTnLst>
+                  <p:par>
+                    <p:cTn id="3" fill="hold">
+                      <p:stCondLst>
+                        <p:cond delay="indefinite"/>
+                      </p:stCondLst>
+                      <p:childTnLst>
+                        <p:par>
+                          <p:cTn id="4" fill="hold">
+                            <p:stCondLst>
+                              <p:cond delay="0"/>
+                            </p:stCondLst>
+                            <p:childTnLst>
+                              <p:par>
+                                <p:cTn id="5" presetID="1" presetClass="entr" presetSubtype="0" fill="hold" grpId="0" nodeType="clickEffect">
+                                  <p:stCondLst>
+                                    <p:cond delay="0"/>
+                                  </p:stCondLst>
+                                  <p:childTnLst>
+                                    <p:set>
+                                      <p:cBhvr>
+                                        <p:cTn id="6" dur="1" fill="hold">
+                                          <p:stCondLst>
+                                            <p:cond delay="0"/>
+                                          </p:stCondLst>
+                                        </p:cTn>
+                                        <p:tgtEl>
+                                          <p:spTgt spid="3">
+                                            <p:txEl>
+                                              <p:pRg st="0" end="0"/>
+                                            </p:txEl>
+                                          </p:spTgt>
+                                        </p:tgtEl>
+                                        <p:attrNameLst>
+                                          <p:attrName>style.visibility</p:attrName>
+                                        </p:attrNameLst>
+                                      </p:cBhvr>
+                                      <p:to>
+                                        <p:strVal val="visible"/>
+                                      </p:to>
+                                    </p:set>
+                                  </p:childTnLst>
+                                </p:cTn>
+                              </p:par>
+                            </p:childTnLst>
+                          </p:cTn>
+                        </p:par>
+                      </p:childTnLst>
+                    </p:cTn>
+                  </p:par>
+                  <p:par>
+                    <p:cTn id="7" fill="hold">
+                      <p:stCondLst>
+                        <p:cond delay="indefinite"/>
+                      </p:stCondLst>
+                      <p:childTnLst>
+                        <p:par>
+                          <p:cTn id="8" fill="hold">
+                            <p:stCondLst>
+                              <p:cond delay="0"/>
+                            </p:stCondLst>
+                            <p:childTnLst>
+                              <p:par>
+                                <p:cTn id="9" presetID="1" presetClass="entr" presetSubtype="0" fill="hold" grpId="0" nodeType="clickEffect">
+                                  <p:stCondLst>
+                                    <p:cond delay="0"/>
+                                  </p:stCondLst>
+                                  <p:childTnLst>
+                                    <p:set>
+                                      <p:cBhvr>
+                                        <p:cTn id="10" dur="1" fill="hold">
+                                          <p:stCondLst>
+                                            <p:cond delay="0"/>
+                                          </p:stCondLst>
+                                        </p:cTn>
+                                        <p:tgtEl>
+                                          <p:spTgt spid="3">
+                                            <p:txEl>
+                                              <p:pRg st="1" end="1"/>
+                                            </p:txEl>
+                                          </p:spTgt>
+                                        </p:tgtEl>
+                                        <p:attrNameLst>
+                                          <p:attrName>style.visibility</p:attrName>
+                                        </p:attrNameLst>
+                                      </p:cBhvr>
+                                      <p:to>
+                                        <p:strVal val="visible"/>
+                                      </p:to>
+                                    </p:set>
+                                  </p:childTnLst>
+                                </p:cTn>
+                              </p:par>
+                            </p:childTnLst>
+                          </p:cTn>
+                        </p:par>
+                      </p:childTnLst>
+                    </p:cTn>
+                  </p:par>
+                  <p:par>
+                    <p:cTn id="11" fill="hold">
+                      <p:stCondLst>
+                        <p:cond delay="indefinite"/>
+                      </p:stCondLst>
+                      <p:childTnLst>
+                        <p:par>
+                          <p:cTn id="12" fill="hold">
+                            <p:stCondLst>
+                              <p:cond delay="0"/>
+                            </p:stCondLst>
+                            <p:childTnLst>
+                              <p:par>
+                                <p:cTn id="13" presetID="1" presetClass="entr" presetSubtype="0" fill="hold" grpId="0" nodeType="clickEffect">
+                                  <p:stCondLst>
+                                    <p:cond delay="0"/>
+                                  </p:stCondLst>
+                                  <p:childTnLst>
+                                    <p:set>
+                                      <p:cBhvr>
+                                        <p:cTn id="14" dur="1" fill="hold">
+                                          <p:stCondLst>
+                                            <p:cond delay="0"/>
+                                          </p:stCondLst>
+                                        </p:cTn>
+                                        <p:tgtEl>
+                                          <p:spTgt spid="3">
+                                            <p:txEl>
+                                              <p:pRg st="2" end="2"/>
+                                            </p:txEl>
+                                          </p:spTgt>
+                                        </p:tgtEl>
+                                        <p:attrNameLst>
+                                          <p:attrName>style.visibility</p:attrName>
+                                        </p:attrNameLst>
+                                      </p:cBhvr>
+                                      <p:to>
+                                        <p:strVal val="visible"/>
+                                      </p:to>
+                                    </p:set>
+                                  </p:childTnLst>
+                                </p:cTn>
+                              </p:par>
+                            </p:childTnLst>
+                          </p:cTn>
+                        </p:par>
+                      </p:childTnLst>
+                    </p:cTn>
+                  </p:par>
+                  <p:par>
+                    <p:cTn id="15" fill="hold">
+                      <p:stCondLst>
+                        <p:cond delay="indefinite"/>
+                      </p:stCondLst>
+                      <p:childTnLst>
+                        <p:par>
+                          <p:cTn id="16" fill="hold">
+                            <p:stCondLst>
+                              <p:cond delay="0"/>
+                            </p:stCondLst>
+                            <p:childTnLst>
+                              <p:par>
+                                <p:cTn id="17" presetID="1" presetClass="entr" presetSubtype="0" fill="hold" grpId="0" nodeType="clickEffect">
+                                  <p:stCondLst>
+                                    <p:cond delay="0"/>
+                                  </p:stCondLst>
+                                  <p:childTnLst>
+                                    <p:set>
+                                      <p:cBhvr>
+                                        <p:cTn id="18" dur="1" fill="hold">
+                                          <p:stCondLst>
+                                            <p:cond delay="0"/>
+                                          </p:stCondLst>
+                                        </p:cTn>
+                                        <p:tgtEl>
+                                          <p:spTgt spid="3">
+                                            <p:txEl>
+                                              <p:pRg st="3" end="3"/>
+                                            </p:txEl>
+                                          </p:spTgt>
+                                        </p:tgtEl>
+                                        <p:attrNameLst>
+                                          <p:attrName>style.visibility</p:attrName>
+                                        </p:attrNameLst>
+                                      </p:cBhvr>
+                                      <p:to>
+                                        <p:strVal val="visible"/>
+                                      </p:to>
+                                    </p:set>
+                                  </p:childTnLst>
+                                </p:cTn>
+                              </p:par>
+                            </p:childTnLst>
+                          </p:cTn>
+                        </p:par>
+                      </p:childTnLst>
+                    </p:cTn>
+                  </p:par>
+                  <p:par>
+                    <p:cTn id="19" fill="hold">
+                      <p:stCondLst>
+                        <p:cond delay="indefinite"/>
+                      </p:stCondLst>
+                      <p:childTnLst>
+                        <p:par>
+                          <p:cTn id="20" fill="hold">
+                            <p:stCondLst>
+                              <p:cond delay="0"/>
+                            </p:stCondLst>
+                            <p:childTnLst>
+                              <p:par>
+                                <p:cTn id="21" presetID="1" presetClass="entr" presetSubtype="0" fill="hold" grpId="0" nodeType="clickEffect">
+                                  <p:stCondLst>
+                                    <p:cond delay="0"/>
+                                  </p:stCondLst>
+                                  <p:childTnLst>
+                                    <p:set>
+                                      <p:cBhvr>
+                                        <p:cTn id="22" dur="1" fill="hold">
+                                          <p:stCondLst>
+                                            <p:cond delay="0"/>
+                                          </p:stCondLst>
+                                        </p:cTn>
+                                        <p:tgtEl>
+                                          <p:spTgt spid="3">
+                                            <p:txEl>
+                                              <p:pRg st="4" end="4"/>
+                                            </p:txEl>
+                                          </p:spTgt>
+                                        </p:tgtEl>
+                                        <p:attrNameLst>
+                                          <p:attrName>style.visibility</p:attrName>
+                                        </p:attrNameLst>
+                                      </p:cBhvr>
+                                      <p:to>
+                                        <p:strVal val="visible"/>
+                                      </p:to>
+                                    </p:set>
+                                  </p:childTnLst>
+                                </p:cTn>
+                              </p:par>
+                            </p:childTnLst>
+                          </p:cTn>
+                        </p:par>
+                      </p:childTnLst>
+                    </p:cTn>
+                  </p:par>
+                  <p:par>
+                    <p:cTn id="23" fill="hold">
+                      <p:stCondLst>
+                        <p:cond delay="indefinite"/>
+                      </p:stCondLst>
+                      <p:childTnLst>
+                        <p:par>
+                          <p:cTn id="24" fill="hold">
+                            <p:stCondLst>
+                              <p:cond delay="0"/>
+                            </p:stCondLst>
+                            <p:childTnLst>
+                              <p:par>
+                                <p:cTn id="25" presetID="1" presetClass="entr" presetSubtype="0" fill="hold" grpId="0" nodeType="clickEffect">
+                                  <p:stCondLst>
+                                    <p:cond delay="0"/>
+                                  </p:stCondLst>
+                                  <p:childTnLst>
+                                    <p:set>
+                                      <p:cBhvr>
+                                        <p:cTn id="26" dur="1" fill="hold">
+                                          <p:stCondLst>
+                                            <p:cond delay="0"/>
+                                          </p:stCondLst>
+                                        </p:cTn>
+                                        <p:tgtEl>
+                                          <p:spTgt spid="3">
+                                            <p:txEl>
+                                              <p:pRg st="5" end="5"/>
+                                            </p:txEl>
+                                          </p:spTgt>
+                                        </p:tgtEl>
+                                        <p:attrNameLst>
+                                          <p:attrName>style.visibility</p:attrName>
+                                        </p:attrNameLst>
+                                      </p:cBhvr>
+                                      <p:to>
+                                        <p:strVal val="visible"/>
+                                      </p:to>
+                                    </p:set>
+                                  </p:childTnLst>
+                                </p:cTn>
+                              </p:par>
+                            </p:childTnLst>
+                          </p:cTn>
+                        </p:par>
+                      </p:childTnLst>
+                    </p:cTn>
+                  </p:par>
+                  <p:par>
+                    <p:cTn id="27" fill="hold">
+                      <p:stCondLst>
+                        <p:cond delay="indefinite"/>
+                      </p:stCondLst>
+                      <p:childTnLst>
+                        <p:par>
+                          <p:cTn id="28" fill="hold">
+                            <p:stCondLst>
+                              <p:cond delay="0"/>
+                            </p:stCondLst>
+                            <p:childTnLst>
+                              <p:par>
+                                <p:cTn id="29" presetID="1" presetClass="entr" presetSubtype="0" fill="hold" grpId="0" nodeType="clickEffect">
+                                  <p:stCondLst>
+                                    <p:cond delay="0"/>
+                                  </p:stCondLst>
+                                  <p:childTnLst>
+                                    <p:set>
+                                      <p:cBhvr>
+                                        <p:cTn id="30" dur="1" fill="hold">
+                                          <p:stCondLst>
+                                            <p:cond delay="0"/>
+                                          </p:stCondLst>
+                                        </p:cTn>
+                                        <p:tgtEl>
+                                          <p:spTgt spid="3">
+                                            <p:txEl>
+                                              <p:pRg st="6" end="6"/>
+                                            </p:txEl>
+                                          </p:spTgt>
+                                        </p:tgtEl>
+                                        <p:attrNameLst>
+                                          <p:attrName>style.visibility</p:attrName>
+                                        </p:attrNameLst>
+                                      </p:cBhvr>
+                                      <p:to>
+                                        <p:strVal val="visible"/>
+                                      </p:to>
+                                    </p:set>
+                                  </p:childTnLst>
+                                </p:cTn>
+                              </p:par>
+                              <p:par>
+                                <p:cTn id="31" presetID="1" presetClass="entr" presetSubtype="0" fill="hold" grpId="0" nodeType="withEffect">
+                                  <p:stCondLst>
+                                    <p:cond delay="0"/>
+                                  </p:stCondLst>
+                                  <p:childTnLst>
+                                    <p:set>
+                                      <p:cBhvr>
+                                        <p:cTn id="32" dur="1" fill="hold">
+                                          <p:stCondLst>
+                                            <p:cond delay="0"/>
+                                          </p:stCondLst>
+                                        </p:cTn>
+                                        <p:tgtEl>
+                                          <p:spTgt spid="3">
+                                            <p:txEl>
+                                              <p:pRg st="7" end="7"/>
+                                            </p:txEl>
+                                          </p:spTgt>
+                                        </p:tgtEl>
+                                        <p:attrNameLst>
+                                          <p:attrName>style.visibility</p:attrName>
+                                        </p:attrNameLst>
+                                      </p:cBhvr>
+                                      <p:to>
+                                        <p:strVal val="visible"/>
+                                      </p:to>
+                                    </p:set>
+                                  </p:childTnLst>
+                                </p:cTn>
+                              </p:par>
+                            </p:childTnLst>
+                          </p:cTn>
+                        </p:par>
+                      </p:childTnLst>
+                    </p:cTn>
+                  </p:par>
+                </p:childTnLst>
+              </p:cTn>
+              <p:prevCondLst>
+                <p:cond evt="onPrev" delay="0">
+                  <p:tgtEl>
+                    <p:sldTgt/>
+                  </p:tgtEl>
+                </p:cond>
+              </p:prevCondLst>
+              <p:nextCondLst>
+                <p:cond evt="onNext" delay="0">
+                  <p:tgtEl>
+                    <p:sldTgt/>
+                  </p:tgtEl>
+                </p:cond>
+              </p:nextCondLst>
+            </p:seq>
+          </p:childTnLst>
+        </p:cTn>
+      </p:par>
+    </p:tnLst>
+    <p:bldLst>
+      <p:bldP spid="3" grpId="0" build="p"/>
+    </p:bldLst>
+  </p:timing>
 </p:sld>
 </file>
 

</xml_diff>